<commit_message>
added fig of experiment
</commit_message>
<xml_diff>
--- a/lab_reports/viscosity_of_water/diagrams.pptx
+++ b/lab_reports/viscosity_of_water/diagrams.pptx
@@ -2964,64 +2964,129 @@
           <a:chExt cx="0" cy="0"/>
         </a:xfrm>
       </p:grpSpPr>
-      <p:sp>
-        <p:nvSpPr>
-          <p:cNvPr id="6" name="Rectangle 5"/>
+      <p:grpSp>
+        <p:nvGrpSpPr>
+          <p:cNvPr id="10" name="Group 9"/>
+          <p:cNvGrpSpPr/>
+          <p:nvPr/>
+        </p:nvGrpSpPr>
+        <p:grpSpPr>
+          <a:xfrm>
+            <a:off x="2743199" y="1560287"/>
+            <a:ext cx="1072055" cy="1150146"/>
+            <a:chOff x="2743200" y="1192804"/>
+            <a:chExt cx="1183341" cy="1496608"/>
+          </a:xfrm>
+        </p:grpSpPr>
+        <p:sp>
+          <p:nvSpPr>
+            <p:cNvPr id="6" name="Rectangle 5"/>
+            <p:cNvSpPr/>
+            <p:nvPr/>
+          </p:nvSpPr>
+          <p:spPr>
+            <a:xfrm>
+              <a:off x="2743200" y="1506071"/>
+              <a:ext cx="1183341" cy="1183341"/>
+            </a:xfrm>
+            <a:prstGeom prst="rect">
+              <a:avLst/>
+            </a:prstGeom>
+            <a:ln w="31750"/>
+          </p:spPr>
+          <p:style>
+            <a:lnRef idx="2">
+              <a:schemeClr val="dk1"/>
+            </a:lnRef>
+            <a:fillRef idx="1">
+              <a:schemeClr val="lt1"/>
+            </a:fillRef>
+            <a:effectRef idx="0">
+              <a:schemeClr val="dk1"/>
+            </a:effectRef>
+            <a:fontRef idx="minor">
+              <a:schemeClr val="dk1"/>
+            </a:fontRef>
+          </p:style>
+          <p:txBody>
+            <a:bodyPr rtlCol="0" anchor="ctr"/>
+            <a:lstStyle/>
+            <a:p>
+              <a:pPr algn="ctr"/>
+              <a:endParaRPr lang="en-GB"/>
+            </a:p>
+          </p:txBody>
+        </p:sp>
+        <p:sp>
+          <p:nvSpPr>
+            <p:cNvPr id="7" name="Rectangle 6"/>
+            <p:cNvSpPr/>
+            <p:nvPr/>
+          </p:nvSpPr>
+          <p:spPr>
+            <a:xfrm>
+              <a:off x="2765094" y="1192804"/>
+              <a:ext cx="1144426" cy="626533"/>
+            </a:xfrm>
+            <a:prstGeom prst="rect">
+              <a:avLst/>
+            </a:prstGeom>
+            <a:solidFill>
+              <a:schemeClr val="bg1"/>
+            </a:solidFill>
+            <a:ln>
+              <a:noFill/>
+            </a:ln>
+          </p:spPr>
+          <p:style>
+            <a:lnRef idx="2">
+              <a:schemeClr val="accent1">
+                <a:shade val="50000"/>
+              </a:schemeClr>
+            </a:lnRef>
+            <a:fillRef idx="1">
+              <a:schemeClr val="accent1"/>
+            </a:fillRef>
+            <a:effectRef idx="0">
+              <a:schemeClr val="accent1"/>
+            </a:effectRef>
+            <a:fontRef idx="minor">
+              <a:schemeClr val="lt1"/>
+            </a:fontRef>
+          </p:style>
+          <p:txBody>
+            <a:bodyPr rtlCol="0" anchor="ctr"/>
+            <a:lstStyle/>
+            <a:p>
+              <a:pPr algn="ctr"/>
+              <a:endParaRPr lang="en-GB"/>
+            </a:p>
+          </p:txBody>
+        </p:sp>
+      </p:grpSp>
+      <p:sp>
+        <p:nvSpPr>
+          <p:cNvPr id="8" name="Rectangle 7"/>
           <p:cNvSpPr/>
           <p:nvPr/>
         </p:nvSpPr>
         <p:spPr>
           <a:xfrm>
-            <a:off x="2743200" y="1506071"/>
-            <a:ext cx="1183341" cy="1183341"/>
-          </a:xfrm>
-          <a:prstGeom prst="rect">
-            <a:avLst/>
-          </a:prstGeom>
-          <a:ln w="31750"/>
-        </p:spPr>
-        <p:style>
-          <a:lnRef idx="2">
-            <a:schemeClr val="dk1"/>
-          </a:lnRef>
-          <a:fillRef idx="1">
-            <a:schemeClr val="lt1"/>
-          </a:fillRef>
-          <a:effectRef idx="0">
-            <a:schemeClr val="dk1"/>
-          </a:effectRef>
-          <a:fontRef idx="minor">
-            <a:schemeClr val="dk1"/>
-          </a:fontRef>
-        </p:style>
-        <p:txBody>
-          <a:bodyPr rtlCol="0" anchor="ctr"/>
-          <a:lstStyle/>
-          <a:p>
-            <a:pPr algn="ctr"/>
-            <a:endParaRPr lang="en-GB"/>
-          </a:p>
-        </p:txBody>
-      </p:sp>
-      <p:sp>
-        <p:nvSpPr>
-          <p:cNvPr id="7" name="Rectangle 6"/>
-          <p:cNvSpPr/>
-          <p:nvPr/>
-        </p:nvSpPr>
-        <p:spPr>
-          <a:xfrm>
-            <a:off x="2760133" y="1192804"/>
-            <a:ext cx="1159200" cy="626533"/>
+            <a:off x="3821441" y="2438400"/>
+            <a:ext cx="588309" cy="95250"/>
           </a:xfrm>
           <a:prstGeom prst="rect">
             <a:avLst/>
           </a:prstGeom>
           <a:solidFill>
-            <a:schemeClr val="bg1"/>
+            <a:schemeClr val="bg1">
+              <a:lumMod val="95000"/>
+            </a:schemeClr>
           </a:solidFill>
-          <a:ln>
-            <a:noFill/>
+          <a:ln w="19050">
+            <a:solidFill>
+              <a:schemeClr val="tx1"/>
+            </a:solidFill>
           </a:ln>
         </p:spPr>
         <p:style>
@@ -3051,21 +3116,21 @@
       </p:sp>
       <p:sp>
         <p:nvSpPr>
-          <p:cNvPr id="8" name="Rectangle 7"/>
+          <p:cNvPr id="14" name="Rectangle 13"/>
           <p:cNvSpPr/>
           <p:nvPr/>
         </p:nvSpPr>
         <p:spPr>
           <a:xfrm>
-            <a:off x="3926541" y="2438400"/>
-            <a:ext cx="588309" cy="95250"/>
+            <a:off x="4015677" y="3288980"/>
+            <a:ext cx="956441" cy="116372"/>
           </a:xfrm>
           <a:prstGeom prst="rect">
             <a:avLst/>
           </a:prstGeom>
           <a:solidFill>
             <a:schemeClr val="bg1">
-              <a:lumMod val="95000"/>
+              <a:lumMod val="75000"/>
             </a:schemeClr>
           </a:solidFill>
           <a:ln w="31750">
@@ -3099,6 +3164,1001 @@
           </a:p>
         </p:txBody>
       </p:sp>
+      <p:grpSp>
+        <p:nvGrpSpPr>
+          <p:cNvPr id="20" name="Group 19"/>
+          <p:cNvGrpSpPr/>
+          <p:nvPr/>
+        </p:nvGrpSpPr>
+        <p:grpSpPr>
+          <a:xfrm>
+            <a:off x="5225733" y="2710432"/>
+            <a:ext cx="208921" cy="694920"/>
+            <a:chOff x="5131782" y="2710432"/>
+            <a:chExt cx="208921" cy="694920"/>
+          </a:xfrm>
+        </p:grpSpPr>
+        <p:sp>
+          <p:nvSpPr>
+            <p:cNvPr id="15" name="Rectangle 14"/>
+            <p:cNvSpPr/>
+            <p:nvPr/>
+          </p:nvSpPr>
+          <p:spPr>
+            <a:xfrm>
+              <a:off x="5204070" y="2710432"/>
+              <a:ext cx="73573" cy="694920"/>
+            </a:xfrm>
+            <a:prstGeom prst="rect">
+              <a:avLst/>
+            </a:prstGeom>
+            <a:solidFill>
+              <a:schemeClr val="bg1">
+                <a:lumMod val="95000"/>
+              </a:schemeClr>
+            </a:solidFill>
+            <a:ln w="15875">
+              <a:solidFill>
+                <a:schemeClr val="tx1"/>
+              </a:solidFill>
+            </a:ln>
+          </p:spPr>
+          <p:style>
+            <a:lnRef idx="2">
+              <a:schemeClr val="accent1">
+                <a:shade val="50000"/>
+              </a:schemeClr>
+            </a:lnRef>
+            <a:fillRef idx="1">
+              <a:schemeClr val="accent1"/>
+            </a:fillRef>
+            <a:effectRef idx="0">
+              <a:schemeClr val="accent1"/>
+            </a:effectRef>
+            <a:fontRef idx="minor">
+              <a:schemeClr val="lt1"/>
+            </a:fontRef>
+          </p:style>
+          <p:txBody>
+            <a:bodyPr rtlCol="0" anchor="ctr"/>
+            <a:lstStyle/>
+            <a:p>
+              <a:pPr algn="ctr"/>
+              <a:endParaRPr lang="en-GB"/>
+            </a:p>
+          </p:txBody>
+        </p:sp>
+        <p:cxnSp>
+          <p:nvCxnSpPr>
+            <p:cNvPr id="17" name="Straight Connector 16"/>
+            <p:cNvCxnSpPr/>
+            <p:nvPr/>
+          </p:nvCxnSpPr>
+          <p:spPr>
+            <a:xfrm>
+              <a:off x="5131782" y="3405352"/>
+              <a:ext cx="208921" cy="0"/>
+            </a:xfrm>
+            <a:prstGeom prst="line">
+              <a:avLst/>
+            </a:prstGeom>
+            <a:ln w="31750">
+              <a:solidFill>
+                <a:schemeClr val="tx1"/>
+              </a:solidFill>
+            </a:ln>
+          </p:spPr>
+          <p:style>
+            <a:lnRef idx="1">
+              <a:schemeClr val="accent1"/>
+            </a:lnRef>
+            <a:fillRef idx="0">
+              <a:schemeClr val="accent1"/>
+            </a:fillRef>
+            <a:effectRef idx="0">
+              <a:schemeClr val="accent1"/>
+            </a:effectRef>
+            <a:fontRef idx="minor">
+              <a:schemeClr val="tx1"/>
+            </a:fontRef>
+          </p:style>
+        </p:cxnSp>
+      </p:grpSp>
+      <p:sp>
+        <p:nvSpPr>
+          <p:cNvPr id="21" name="Rectangle 20"/>
+          <p:cNvSpPr/>
+          <p:nvPr/>
+        </p:nvSpPr>
+        <p:spPr>
+          <a:xfrm>
+            <a:off x="2932388" y="2723012"/>
+            <a:ext cx="725213" cy="125999"/>
+          </a:xfrm>
+          <a:prstGeom prst="rect">
+            <a:avLst/>
+          </a:prstGeom>
+          <a:solidFill>
+            <a:schemeClr val="tx1">
+              <a:lumMod val="50000"/>
+              <a:lumOff val="50000"/>
+            </a:schemeClr>
+          </a:solidFill>
+          <a:ln w="28575">
+            <a:solidFill>
+              <a:schemeClr val="tx1"/>
+            </a:solidFill>
+          </a:ln>
+        </p:spPr>
+        <p:style>
+          <a:lnRef idx="2">
+            <a:schemeClr val="accent1">
+              <a:shade val="50000"/>
+            </a:schemeClr>
+          </a:lnRef>
+          <a:fillRef idx="1">
+            <a:schemeClr val="accent1"/>
+          </a:fillRef>
+          <a:effectRef idx="0">
+            <a:schemeClr val="accent1"/>
+          </a:effectRef>
+          <a:fontRef idx="minor">
+            <a:schemeClr val="lt1"/>
+          </a:fontRef>
+        </p:style>
+        <p:txBody>
+          <a:bodyPr rtlCol="0" anchor="ctr"/>
+          <a:lstStyle/>
+          <a:p>
+            <a:pPr algn="ctr"/>
+            <a:endParaRPr lang="en-GB"/>
+          </a:p>
+        </p:txBody>
+      </p:sp>
+      <p:cxnSp>
+        <p:nvCxnSpPr>
+          <p:cNvPr id="24" name="Straight Connector 23"/>
+          <p:cNvCxnSpPr/>
+          <p:nvPr/>
+        </p:nvCxnSpPr>
+        <p:spPr>
+          <a:xfrm flipH="1">
+            <a:off x="3345088" y="2861591"/>
+            <a:ext cx="4362" cy="556341"/>
+          </a:xfrm>
+          <a:prstGeom prst="line">
+            <a:avLst/>
+          </a:prstGeom>
+          <a:ln w="31750">
+            <a:solidFill>
+              <a:schemeClr val="tx1"/>
+            </a:solidFill>
+          </a:ln>
+        </p:spPr>
+        <p:style>
+          <a:lnRef idx="1">
+            <a:schemeClr val="accent1"/>
+          </a:lnRef>
+          <a:fillRef idx="0">
+            <a:schemeClr val="accent1"/>
+          </a:fillRef>
+          <a:effectRef idx="0">
+            <a:schemeClr val="accent1"/>
+          </a:effectRef>
+          <a:fontRef idx="minor">
+            <a:schemeClr val="tx1"/>
+          </a:fontRef>
+        </p:style>
+      </p:cxnSp>
+      <p:cxnSp>
+        <p:nvCxnSpPr>
+          <p:cNvPr id="33" name="Straight Connector 32"/>
+          <p:cNvCxnSpPr/>
+          <p:nvPr/>
+        </p:nvCxnSpPr>
+        <p:spPr>
+          <a:xfrm flipH="1">
+            <a:off x="3212848" y="2858878"/>
+            <a:ext cx="4362" cy="556341"/>
+          </a:xfrm>
+          <a:prstGeom prst="line">
+            <a:avLst/>
+          </a:prstGeom>
+          <a:ln w="31750">
+            <a:solidFill>
+              <a:schemeClr val="tx1"/>
+            </a:solidFill>
+          </a:ln>
+        </p:spPr>
+        <p:style>
+          <a:lnRef idx="1">
+            <a:schemeClr val="accent1"/>
+          </a:lnRef>
+          <a:fillRef idx="0">
+            <a:schemeClr val="accent1"/>
+          </a:fillRef>
+          <a:effectRef idx="0">
+            <a:schemeClr val="accent1"/>
+          </a:effectRef>
+          <a:fontRef idx="minor">
+            <a:schemeClr val="tx1"/>
+          </a:fontRef>
+        </p:style>
+      </p:cxnSp>
+      <p:sp>
+        <p:nvSpPr>
+          <p:cNvPr id="34" name="Rectangle 33"/>
+          <p:cNvSpPr/>
+          <p:nvPr/>
+        </p:nvSpPr>
+        <p:spPr>
+          <a:xfrm>
+            <a:off x="2932388" y="3371086"/>
+            <a:ext cx="725213" cy="54000"/>
+          </a:xfrm>
+          <a:prstGeom prst="rect">
+            <a:avLst/>
+          </a:prstGeom>
+          <a:solidFill>
+            <a:schemeClr val="tx1">
+              <a:lumMod val="65000"/>
+              <a:lumOff val="35000"/>
+            </a:schemeClr>
+          </a:solidFill>
+          <a:ln w="28575">
+            <a:solidFill>
+              <a:schemeClr val="tx1"/>
+            </a:solidFill>
+          </a:ln>
+        </p:spPr>
+        <p:style>
+          <a:lnRef idx="2">
+            <a:schemeClr val="accent1">
+              <a:shade val="50000"/>
+            </a:schemeClr>
+          </a:lnRef>
+          <a:fillRef idx="1">
+            <a:schemeClr val="accent1"/>
+          </a:fillRef>
+          <a:effectRef idx="0">
+            <a:schemeClr val="accent1"/>
+          </a:effectRef>
+          <a:fontRef idx="minor">
+            <a:schemeClr val="lt1"/>
+          </a:fontRef>
+        </p:style>
+        <p:txBody>
+          <a:bodyPr rtlCol="0" anchor="ctr"/>
+          <a:lstStyle/>
+          <a:p>
+            <a:pPr algn="ctr"/>
+            <a:endParaRPr lang="en-GB"/>
+          </a:p>
+        </p:txBody>
+      </p:sp>
+      <p:grpSp>
+        <p:nvGrpSpPr>
+          <p:cNvPr id="38" name="Group 37"/>
+          <p:cNvGrpSpPr/>
+          <p:nvPr/>
+        </p:nvGrpSpPr>
+        <p:grpSpPr>
+          <a:xfrm>
+            <a:off x="4157636" y="2596661"/>
+            <a:ext cx="658351" cy="662629"/>
+            <a:chOff x="4157636" y="2626351"/>
+            <a:chExt cx="658351" cy="662629"/>
+          </a:xfrm>
+        </p:grpSpPr>
+        <p:grpSp>
+          <p:nvGrpSpPr>
+            <p:cNvPr id="11" name="Group 10"/>
+            <p:cNvGrpSpPr/>
+            <p:nvPr/>
+          </p:nvGrpSpPr>
+          <p:grpSpPr>
+            <a:xfrm>
+              <a:off x="4247629" y="2626351"/>
+              <a:ext cx="492538" cy="662629"/>
+              <a:chOff x="2743200" y="1192804"/>
+              <a:chExt cx="1183341" cy="1496608"/>
+            </a:xfrm>
+          </p:grpSpPr>
+          <p:sp>
+            <p:nvSpPr>
+              <p:cNvPr id="12" name="Rectangle 11"/>
+              <p:cNvSpPr/>
+              <p:nvPr/>
+            </p:nvSpPr>
+            <p:spPr>
+              <a:xfrm>
+                <a:off x="2743200" y="1506071"/>
+                <a:ext cx="1183341" cy="1183341"/>
+              </a:xfrm>
+              <a:prstGeom prst="rect">
+                <a:avLst/>
+              </a:prstGeom>
+              <a:ln w="31750"/>
+            </p:spPr>
+            <p:style>
+              <a:lnRef idx="2">
+                <a:schemeClr val="dk1"/>
+              </a:lnRef>
+              <a:fillRef idx="1">
+                <a:schemeClr val="lt1"/>
+              </a:fillRef>
+              <a:effectRef idx="0">
+                <a:schemeClr val="dk1"/>
+              </a:effectRef>
+              <a:fontRef idx="minor">
+                <a:schemeClr val="dk1"/>
+              </a:fontRef>
+            </p:style>
+            <p:txBody>
+              <a:bodyPr rtlCol="0" anchor="ctr"/>
+              <a:lstStyle/>
+              <a:p>
+                <a:pPr algn="ctr"/>
+                <a:endParaRPr lang="en-GB"/>
+              </a:p>
+            </p:txBody>
+          </p:sp>
+          <p:sp>
+            <p:nvSpPr>
+              <p:cNvPr id="13" name="Rectangle 12"/>
+              <p:cNvSpPr/>
+              <p:nvPr/>
+            </p:nvSpPr>
+            <p:spPr>
+              <a:xfrm>
+                <a:off x="2785384" y="1192804"/>
+                <a:ext cx="1107089" cy="626533"/>
+              </a:xfrm>
+              <a:prstGeom prst="rect">
+                <a:avLst/>
+              </a:prstGeom>
+              <a:solidFill>
+                <a:schemeClr val="bg1"/>
+              </a:solidFill>
+              <a:ln>
+                <a:noFill/>
+              </a:ln>
+            </p:spPr>
+            <p:style>
+              <a:lnRef idx="2">
+                <a:schemeClr val="accent1">
+                  <a:shade val="50000"/>
+                </a:schemeClr>
+              </a:lnRef>
+              <a:fillRef idx="1">
+                <a:schemeClr val="accent1"/>
+              </a:fillRef>
+              <a:effectRef idx="0">
+                <a:schemeClr val="accent1"/>
+              </a:effectRef>
+              <a:fontRef idx="minor">
+                <a:schemeClr val="lt1"/>
+              </a:fontRef>
+            </p:style>
+            <p:txBody>
+              <a:bodyPr rtlCol="0" anchor="ctr"/>
+              <a:lstStyle/>
+              <a:p>
+                <a:pPr algn="ctr"/>
+                <a:endParaRPr lang="en-GB"/>
+              </a:p>
+            </p:txBody>
+          </p:sp>
+        </p:grpSp>
+        <p:cxnSp>
+          <p:nvCxnSpPr>
+            <p:cNvPr id="36" name="Straight Connector 35"/>
+            <p:cNvCxnSpPr/>
+            <p:nvPr/>
+          </p:nvCxnSpPr>
+          <p:spPr>
+            <a:xfrm>
+              <a:off x="4157636" y="2765051"/>
+              <a:ext cx="90000" cy="0"/>
+            </a:xfrm>
+            <a:prstGeom prst="line">
+              <a:avLst/>
+            </a:prstGeom>
+            <a:ln w="31750">
+              <a:solidFill>
+                <a:schemeClr val="tx1"/>
+              </a:solidFill>
+            </a:ln>
+          </p:spPr>
+          <p:style>
+            <a:lnRef idx="1">
+              <a:schemeClr val="accent1"/>
+            </a:lnRef>
+            <a:fillRef idx="0">
+              <a:schemeClr val="accent1"/>
+            </a:fillRef>
+            <a:effectRef idx="0">
+              <a:schemeClr val="accent1"/>
+            </a:effectRef>
+            <a:fontRef idx="minor">
+              <a:schemeClr val="tx1"/>
+            </a:fontRef>
+          </p:style>
+        </p:cxnSp>
+        <p:cxnSp>
+          <p:nvCxnSpPr>
+            <p:cNvPr id="37" name="Straight Connector 36"/>
+            <p:cNvCxnSpPr/>
+            <p:nvPr/>
+          </p:nvCxnSpPr>
+          <p:spPr>
+            <a:xfrm>
+              <a:off x="4725987" y="2765051"/>
+              <a:ext cx="90000" cy="0"/>
+            </a:xfrm>
+            <a:prstGeom prst="line">
+              <a:avLst/>
+            </a:prstGeom>
+            <a:ln w="31750">
+              <a:solidFill>
+                <a:schemeClr val="tx1"/>
+              </a:solidFill>
+            </a:ln>
+          </p:spPr>
+          <p:style>
+            <a:lnRef idx="1">
+              <a:schemeClr val="accent1"/>
+            </a:lnRef>
+            <a:fillRef idx="0">
+              <a:schemeClr val="accent1"/>
+            </a:fillRef>
+            <a:effectRef idx="0">
+              <a:schemeClr val="accent1"/>
+            </a:effectRef>
+            <a:fontRef idx="minor">
+              <a:schemeClr val="tx1"/>
+            </a:fontRef>
+          </p:style>
+        </p:cxnSp>
+      </p:grpSp>
+      <p:cxnSp>
+        <p:nvCxnSpPr>
+          <p:cNvPr id="39" name="Straight Arrow Connector 38"/>
+          <p:cNvCxnSpPr/>
+          <p:nvPr/>
+        </p:nvCxnSpPr>
+        <p:spPr>
+          <a:xfrm flipV="1">
+            <a:off x="3291936" y="3484585"/>
+            <a:ext cx="0" cy="293331"/>
+          </a:xfrm>
+          <a:prstGeom prst="straightConnector1">
+            <a:avLst/>
+          </a:prstGeom>
+          <a:ln w="34925">
+            <a:solidFill>
+              <a:schemeClr val="bg1">
+                <a:lumMod val="75000"/>
+              </a:schemeClr>
+            </a:solidFill>
+            <a:tailEnd type="triangle"/>
+          </a:ln>
+        </p:spPr>
+        <p:style>
+          <a:lnRef idx="1">
+            <a:schemeClr val="accent1"/>
+          </a:lnRef>
+          <a:fillRef idx="0">
+            <a:schemeClr val="accent1"/>
+          </a:fillRef>
+          <a:effectRef idx="0">
+            <a:schemeClr val="accent1"/>
+          </a:effectRef>
+          <a:fontRef idx="minor">
+            <a:schemeClr val="tx1"/>
+          </a:fontRef>
+        </p:style>
+      </p:cxnSp>
+      <p:cxnSp>
+        <p:nvCxnSpPr>
+          <p:cNvPr id="41" name="Straight Arrow Connector 40"/>
+          <p:cNvCxnSpPr/>
+          <p:nvPr/>
+        </p:nvCxnSpPr>
+        <p:spPr>
+          <a:xfrm flipV="1">
+            <a:off x="4493897" y="3484584"/>
+            <a:ext cx="0" cy="293331"/>
+          </a:xfrm>
+          <a:prstGeom prst="straightConnector1">
+            <a:avLst/>
+          </a:prstGeom>
+          <a:ln w="34925">
+            <a:solidFill>
+              <a:schemeClr val="bg1">
+                <a:lumMod val="75000"/>
+              </a:schemeClr>
+            </a:solidFill>
+            <a:tailEnd type="triangle"/>
+          </a:ln>
+        </p:spPr>
+        <p:style>
+          <a:lnRef idx="1">
+            <a:schemeClr val="accent1"/>
+          </a:lnRef>
+          <a:fillRef idx="0">
+            <a:schemeClr val="accent1"/>
+          </a:fillRef>
+          <a:effectRef idx="0">
+            <a:schemeClr val="accent1"/>
+          </a:effectRef>
+          <a:fontRef idx="minor">
+            <a:schemeClr val="tx1"/>
+          </a:fontRef>
+        </p:style>
+      </p:cxnSp>
+      <p:sp>
+        <p:nvSpPr>
+          <p:cNvPr id="43" name="TextBox 42"/>
+          <p:cNvSpPr txBox="1"/>
+          <p:nvPr/>
+        </p:nvSpPr>
+        <p:spPr>
+          <a:xfrm>
+            <a:off x="3706835" y="3786342"/>
+            <a:ext cx="1574124" cy="646331"/>
+          </a:xfrm>
+          <a:prstGeom prst="rect">
+            <a:avLst/>
+          </a:prstGeom>
+          <a:noFill/>
+        </p:spPr>
+        <p:txBody>
+          <a:bodyPr wrap="square" rtlCol="0">
+            <a:spAutoFit/>
+          </a:bodyPr>
+          <a:lstStyle/>
+          <a:p>
+            <a:pPr algn="ctr"/>
+            <a:r>
+              <a:rPr lang="en-GB" dirty="0" smtClean="0">
+                <a:latin typeface="CMU Serif Roman" charset="0"/>
+                <a:ea typeface="CMU Serif Roman" charset="0"/>
+                <a:cs typeface="CMU Serif Roman" charset="0"/>
+              </a:rPr>
+              <a:t>Electric</a:t>
+            </a:r>
+            <a:endParaRPr lang="en-GB" dirty="0" smtClean="0">
+              <a:latin typeface="CMU Serif Roman" charset="0"/>
+              <a:ea typeface="CMU Serif Roman" charset="0"/>
+              <a:cs typeface="CMU Serif Roman" charset="0"/>
+            </a:endParaRPr>
+          </a:p>
+          <a:p>
+            <a:pPr algn="ctr"/>
+            <a:r>
+              <a:rPr lang="en-GB" dirty="0" smtClean="0">
+                <a:latin typeface="CMU Serif Roman" charset="0"/>
+                <a:ea typeface="CMU Serif Roman" charset="0"/>
+                <a:cs typeface="CMU Serif Roman" charset="0"/>
+              </a:rPr>
+              <a:t>Scales</a:t>
+            </a:r>
+            <a:endParaRPr lang="en-GB" dirty="0">
+              <a:latin typeface="CMU Serif Roman" charset="0"/>
+              <a:ea typeface="CMU Serif Roman" charset="0"/>
+              <a:cs typeface="CMU Serif Roman" charset="0"/>
+            </a:endParaRPr>
+          </a:p>
+        </p:txBody>
+      </p:sp>
+      <p:sp>
+        <p:nvSpPr>
+          <p:cNvPr id="44" name="TextBox 43"/>
+          <p:cNvSpPr txBox="1"/>
+          <p:nvPr/>
+        </p:nvSpPr>
+        <p:spPr>
+          <a:xfrm>
+            <a:off x="2504874" y="3786972"/>
+            <a:ext cx="1574124" cy="646331"/>
+          </a:xfrm>
+          <a:prstGeom prst="rect">
+            <a:avLst/>
+          </a:prstGeom>
+          <a:noFill/>
+        </p:spPr>
+        <p:txBody>
+          <a:bodyPr wrap="square" rtlCol="0">
+            <a:spAutoFit/>
+          </a:bodyPr>
+          <a:lstStyle/>
+          <a:p>
+            <a:pPr algn="ctr"/>
+            <a:r>
+              <a:rPr lang="en-GB" dirty="0" smtClean="0">
+                <a:latin typeface="CMU Serif Roman" charset="0"/>
+                <a:ea typeface="CMU Serif Roman" charset="0"/>
+                <a:cs typeface="CMU Serif Roman" charset="0"/>
+              </a:rPr>
+              <a:t>Adjustable</a:t>
+            </a:r>
+            <a:endParaRPr lang="en-GB" dirty="0" smtClean="0">
+              <a:latin typeface="CMU Serif Roman" charset="0"/>
+              <a:ea typeface="CMU Serif Roman" charset="0"/>
+              <a:cs typeface="CMU Serif Roman" charset="0"/>
+            </a:endParaRPr>
+          </a:p>
+          <a:p>
+            <a:pPr algn="ctr"/>
+            <a:r>
+              <a:rPr lang="en-GB" dirty="0" smtClean="0">
+                <a:latin typeface="CMU Serif Roman" charset="0"/>
+                <a:ea typeface="CMU Serif Roman" charset="0"/>
+                <a:cs typeface="CMU Serif Roman" charset="0"/>
+              </a:rPr>
+              <a:t>Platform</a:t>
+            </a:r>
+            <a:endParaRPr lang="en-GB" dirty="0">
+              <a:latin typeface="CMU Serif Roman" charset="0"/>
+              <a:ea typeface="CMU Serif Roman" charset="0"/>
+              <a:cs typeface="CMU Serif Roman" charset="0"/>
+            </a:endParaRPr>
+          </a:p>
+        </p:txBody>
+      </p:sp>
+      <p:cxnSp>
+        <p:nvCxnSpPr>
+          <p:cNvPr id="45" name="Straight Arrow Connector 44"/>
+          <p:cNvCxnSpPr/>
+          <p:nvPr/>
+        </p:nvCxnSpPr>
+        <p:spPr>
+          <a:xfrm rot="10800000" flipV="1">
+            <a:off x="3279226" y="1704639"/>
+            <a:ext cx="0" cy="293331"/>
+          </a:xfrm>
+          <a:prstGeom prst="straightConnector1">
+            <a:avLst/>
+          </a:prstGeom>
+          <a:ln w="34925">
+            <a:solidFill>
+              <a:schemeClr val="bg1">
+                <a:lumMod val="75000"/>
+              </a:schemeClr>
+            </a:solidFill>
+            <a:tailEnd type="triangle"/>
+          </a:ln>
+        </p:spPr>
+        <p:style>
+          <a:lnRef idx="1">
+            <a:schemeClr val="accent1"/>
+          </a:lnRef>
+          <a:fillRef idx="0">
+            <a:schemeClr val="accent1"/>
+          </a:fillRef>
+          <a:effectRef idx="0">
+            <a:schemeClr val="accent1"/>
+          </a:effectRef>
+          <a:fontRef idx="minor">
+            <a:schemeClr val="tx1"/>
+          </a:fontRef>
+        </p:style>
+      </p:cxnSp>
+      <p:sp>
+        <p:nvSpPr>
+          <p:cNvPr id="46" name="TextBox 45"/>
+          <p:cNvSpPr txBox="1"/>
+          <p:nvPr/>
+        </p:nvSpPr>
+        <p:spPr>
+          <a:xfrm>
+            <a:off x="2492163" y="1062247"/>
+            <a:ext cx="1574124" cy="646331"/>
+          </a:xfrm>
+          <a:prstGeom prst="rect">
+            <a:avLst/>
+          </a:prstGeom>
+          <a:noFill/>
+        </p:spPr>
+        <p:txBody>
+          <a:bodyPr wrap="square" rtlCol="0">
+            <a:spAutoFit/>
+          </a:bodyPr>
+          <a:lstStyle/>
+          <a:p>
+            <a:pPr algn="ctr"/>
+            <a:r>
+              <a:rPr lang="en-GB" dirty="0" smtClean="0">
+                <a:latin typeface="CMU Serif Roman" charset="0"/>
+                <a:ea typeface="CMU Serif Roman" charset="0"/>
+                <a:cs typeface="CMU Serif Roman" charset="0"/>
+              </a:rPr>
+              <a:t>Water</a:t>
+            </a:r>
+            <a:r>
+              <a:rPr lang="en-GB" dirty="0">
+                <a:latin typeface="CMU Serif Roman" charset="0"/>
+                <a:ea typeface="CMU Serif Roman" charset="0"/>
+                <a:cs typeface="CMU Serif Roman" charset="0"/>
+              </a:rPr>
+              <a:t> </a:t>
+            </a:r>
+            <a:endParaRPr lang="en-GB" dirty="0" smtClean="0">
+              <a:latin typeface="CMU Serif Roman" charset="0"/>
+              <a:ea typeface="CMU Serif Roman" charset="0"/>
+              <a:cs typeface="CMU Serif Roman" charset="0"/>
+            </a:endParaRPr>
+          </a:p>
+          <a:p>
+            <a:pPr algn="ctr"/>
+            <a:r>
+              <a:rPr lang="en-GB" dirty="0" smtClean="0">
+                <a:latin typeface="CMU Serif Roman" charset="0"/>
+                <a:ea typeface="CMU Serif Roman" charset="0"/>
+                <a:cs typeface="CMU Serif Roman" charset="0"/>
+              </a:rPr>
+              <a:t>Tank</a:t>
+            </a:r>
+            <a:endParaRPr lang="en-GB" dirty="0">
+              <a:latin typeface="CMU Serif Roman" charset="0"/>
+              <a:ea typeface="CMU Serif Roman" charset="0"/>
+              <a:cs typeface="CMU Serif Roman" charset="0"/>
+            </a:endParaRPr>
+          </a:p>
+        </p:txBody>
+      </p:sp>
+      <p:cxnSp>
+        <p:nvCxnSpPr>
+          <p:cNvPr id="49" name="Straight Arrow Connector 48"/>
+          <p:cNvCxnSpPr>
+            <a:stCxn id="50" idx="2"/>
+          </p:cNvCxnSpPr>
+          <p:nvPr/>
+        </p:nvCxnSpPr>
+        <p:spPr>
+          <a:xfrm>
+            <a:off x="4247629" y="1708577"/>
+            <a:ext cx="0" cy="704282"/>
+          </a:xfrm>
+          <a:prstGeom prst="straightConnector1">
+            <a:avLst/>
+          </a:prstGeom>
+          <a:ln w="34925">
+            <a:solidFill>
+              <a:schemeClr val="bg1">
+                <a:lumMod val="75000"/>
+              </a:schemeClr>
+            </a:solidFill>
+            <a:tailEnd type="triangle"/>
+          </a:ln>
+        </p:spPr>
+        <p:style>
+          <a:lnRef idx="1">
+            <a:schemeClr val="accent1"/>
+          </a:lnRef>
+          <a:fillRef idx="0">
+            <a:schemeClr val="accent1"/>
+          </a:fillRef>
+          <a:effectRef idx="0">
+            <a:schemeClr val="accent1"/>
+          </a:effectRef>
+          <a:fontRef idx="minor">
+            <a:schemeClr val="tx1"/>
+          </a:fontRef>
+        </p:style>
+      </p:cxnSp>
+      <p:sp>
+        <p:nvSpPr>
+          <p:cNvPr id="50" name="TextBox 49"/>
+          <p:cNvSpPr txBox="1"/>
+          <p:nvPr/>
+        </p:nvSpPr>
+        <p:spPr>
+          <a:xfrm>
+            <a:off x="3460567" y="1062246"/>
+            <a:ext cx="1574124" cy="646331"/>
+          </a:xfrm>
+          <a:prstGeom prst="rect">
+            <a:avLst/>
+          </a:prstGeom>
+          <a:noFill/>
+        </p:spPr>
+        <p:txBody>
+          <a:bodyPr wrap="square" rtlCol="0">
+            <a:spAutoFit/>
+          </a:bodyPr>
+          <a:lstStyle/>
+          <a:p>
+            <a:pPr algn="ctr"/>
+            <a:r>
+              <a:rPr lang="en-GB" smtClean="0">
+                <a:latin typeface="CMU Serif Roman" charset="0"/>
+                <a:ea typeface="CMU Serif Roman" charset="0"/>
+                <a:cs typeface="CMU Serif Roman" charset="0"/>
+              </a:rPr>
+              <a:t>Capillary Tube</a:t>
+            </a:r>
+            <a:endParaRPr lang="en-GB" dirty="0">
+              <a:latin typeface="CMU Serif Roman" charset="0"/>
+              <a:ea typeface="CMU Serif Roman" charset="0"/>
+              <a:cs typeface="CMU Serif Roman" charset="0"/>
+            </a:endParaRPr>
+          </a:p>
+        </p:txBody>
+      </p:sp>
+      <p:cxnSp>
+        <p:nvCxnSpPr>
+          <p:cNvPr id="52" name="Straight Arrow Connector 51"/>
+          <p:cNvCxnSpPr/>
+          <p:nvPr/>
+        </p:nvCxnSpPr>
+        <p:spPr>
+          <a:xfrm>
+            <a:off x="4770987" y="2171908"/>
+            <a:ext cx="0" cy="520576"/>
+          </a:xfrm>
+          <a:prstGeom prst="straightConnector1">
+            <a:avLst/>
+          </a:prstGeom>
+          <a:ln w="34925">
+            <a:solidFill>
+              <a:schemeClr val="bg1">
+                <a:lumMod val="75000"/>
+              </a:schemeClr>
+            </a:solidFill>
+            <a:tailEnd type="triangle"/>
+          </a:ln>
+        </p:spPr>
+        <p:style>
+          <a:lnRef idx="1">
+            <a:schemeClr val="accent1"/>
+          </a:lnRef>
+          <a:fillRef idx="0">
+            <a:schemeClr val="accent1"/>
+          </a:fillRef>
+          <a:effectRef idx="0">
+            <a:schemeClr val="accent1"/>
+          </a:effectRef>
+          <a:fontRef idx="minor">
+            <a:schemeClr val="tx1"/>
+          </a:fontRef>
+        </p:style>
+      </p:cxnSp>
+      <p:sp>
+        <p:nvSpPr>
+          <p:cNvPr id="53" name="TextBox 52"/>
+          <p:cNvSpPr txBox="1"/>
+          <p:nvPr/>
+        </p:nvSpPr>
+        <p:spPr>
+          <a:xfrm>
+            <a:off x="3983925" y="1817090"/>
+            <a:ext cx="1574124" cy="369332"/>
+          </a:xfrm>
+          <a:prstGeom prst="rect">
+            <a:avLst/>
+          </a:prstGeom>
+          <a:noFill/>
+        </p:spPr>
+        <p:txBody>
+          <a:bodyPr wrap="square" rtlCol="0">
+            <a:spAutoFit/>
+          </a:bodyPr>
+          <a:lstStyle/>
+          <a:p>
+            <a:pPr algn="ctr"/>
+            <a:r>
+              <a:rPr lang="en-GB" dirty="0" smtClean="0">
+                <a:latin typeface="CMU Serif Roman" charset="0"/>
+                <a:ea typeface="CMU Serif Roman" charset="0"/>
+                <a:cs typeface="CMU Serif Roman" charset="0"/>
+              </a:rPr>
+              <a:t>Beaker</a:t>
+            </a:r>
+            <a:endParaRPr lang="en-GB" dirty="0">
+              <a:latin typeface="CMU Serif Roman" charset="0"/>
+              <a:ea typeface="CMU Serif Roman" charset="0"/>
+              <a:cs typeface="CMU Serif Roman" charset="0"/>
+            </a:endParaRPr>
+          </a:p>
+        </p:txBody>
+      </p:sp>
+      <p:sp>
+        <p:nvSpPr>
+          <p:cNvPr id="56" name="TextBox 55"/>
+          <p:cNvSpPr txBox="1"/>
+          <p:nvPr/>
+        </p:nvSpPr>
+        <p:spPr>
+          <a:xfrm>
+            <a:off x="4543131" y="1057307"/>
+            <a:ext cx="1574124" cy="646331"/>
+          </a:xfrm>
+          <a:prstGeom prst="rect">
+            <a:avLst/>
+          </a:prstGeom>
+          <a:noFill/>
+        </p:spPr>
+        <p:txBody>
+          <a:bodyPr wrap="square" rtlCol="0">
+            <a:spAutoFit/>
+          </a:bodyPr>
+          <a:lstStyle/>
+          <a:p>
+            <a:pPr algn="ctr"/>
+            <a:r>
+              <a:rPr lang="en-GB" dirty="0" smtClean="0">
+                <a:latin typeface="CMU Serif Roman" charset="0"/>
+                <a:ea typeface="CMU Serif Roman" charset="0"/>
+                <a:cs typeface="CMU Serif Roman" charset="0"/>
+              </a:rPr>
+              <a:t>Measuring</a:t>
+            </a:r>
+            <a:endParaRPr lang="en-GB" dirty="0" smtClean="0">
+              <a:latin typeface="CMU Serif Roman" charset="0"/>
+              <a:ea typeface="CMU Serif Roman" charset="0"/>
+              <a:cs typeface="CMU Serif Roman" charset="0"/>
+            </a:endParaRPr>
+          </a:p>
+          <a:p>
+            <a:pPr algn="ctr"/>
+            <a:r>
+              <a:rPr lang="en-GB" dirty="0" smtClean="0">
+                <a:latin typeface="CMU Serif Roman" charset="0"/>
+                <a:ea typeface="CMU Serif Roman" charset="0"/>
+                <a:cs typeface="CMU Serif Roman" charset="0"/>
+              </a:rPr>
+              <a:t>Cylinder</a:t>
+            </a:r>
+            <a:endParaRPr lang="en-GB" dirty="0">
+              <a:latin typeface="CMU Serif Roman" charset="0"/>
+              <a:ea typeface="CMU Serif Roman" charset="0"/>
+              <a:cs typeface="CMU Serif Roman" charset="0"/>
+            </a:endParaRPr>
+          </a:p>
+        </p:txBody>
+      </p:sp>
+      <p:cxnSp>
+        <p:nvCxnSpPr>
+          <p:cNvPr id="57" name="Straight Arrow Connector 56"/>
+          <p:cNvCxnSpPr>
+            <a:stCxn id="56" idx="2"/>
+          </p:cNvCxnSpPr>
+          <p:nvPr/>
+        </p:nvCxnSpPr>
+        <p:spPr>
+          <a:xfrm>
+            <a:off x="5330193" y="1703638"/>
+            <a:ext cx="9642" cy="912397"/>
+          </a:xfrm>
+          <a:prstGeom prst="straightConnector1">
+            <a:avLst/>
+          </a:prstGeom>
+          <a:ln w="34925">
+            <a:solidFill>
+              <a:schemeClr val="bg1">
+                <a:lumMod val="75000"/>
+              </a:schemeClr>
+            </a:solidFill>
+            <a:tailEnd type="triangle"/>
+          </a:ln>
+        </p:spPr>
+        <p:style>
+          <a:lnRef idx="1">
+            <a:schemeClr val="accent1"/>
+          </a:lnRef>
+          <a:fillRef idx="0">
+            <a:schemeClr val="accent1"/>
+          </a:fillRef>
+          <a:effectRef idx="0">
+            <a:schemeClr val="accent1"/>
+          </a:effectRef>
+          <a:fontRef idx="minor">
+            <a:schemeClr val="tx1"/>
+          </a:fontRef>
+        </p:style>
+      </p:cxnSp>
     </p:spTree>
     <p:extLst>
       <p:ext uri="{BB962C8B-B14F-4D97-AF65-F5344CB8AC3E}">
@@ -3109,6 +4169,13 @@
   <p:clrMapOvr>
     <a:masterClrMapping/>
   </p:clrMapOvr>
+  <p:timing>
+    <p:tnLst>
+      <p:par>
+        <p:cTn id="1" dur="indefinite" restart="never" nodeType="tmRoot"/>
+      </p:par>
+    </p:tnLst>
+  </p:timing>
 </p:sld>
 </file>
 

</xml_diff>